<commit_message>
fixed heatmap ticker and added heatmap chart in ppt
</commit_message>
<xml_diff>
--- a/Presentation/AFL Dashboard.pptx
+++ b/Presentation/AFL Dashboard.pptx
@@ -474,6 +474,93 @@
     </a:lvl9pPr>
   </p:notesStyle>
 </p:notesMaster>
+</file>
+
+<file path=ppt/notesSlides/notesSlide1.xml><?xml version="1.0" encoding="utf-8"?>
+<p:notes xmlns:a="http://schemas.openxmlformats.org/drawingml/2006/main" xmlns:r="http://schemas.openxmlformats.org/officeDocument/2006/relationships" xmlns:p="http://schemas.openxmlformats.org/presentationml/2006/main">
+  <p:cSld>
+    <p:spTree>
+      <p:nvGrpSpPr>
+        <p:cNvPr id="1" name=""/>
+        <p:cNvGrpSpPr/>
+        <p:nvPr/>
+      </p:nvGrpSpPr>
+      <p:grpSpPr>
+        <a:xfrm>
+          <a:off x="0" y="0"/>
+          <a:ext cx="0" cy="0"/>
+          <a:chOff x="0" y="0"/>
+          <a:chExt cx="0" cy="0"/>
+        </a:xfrm>
+      </p:grpSpPr>
+      <p:sp>
+        <p:nvSpPr>
+          <p:cNvPr id="2" name="Slide Image Placeholder 1"/>
+          <p:cNvSpPr>
+            <a:spLocks noGrp="1" noRot="1" noChangeAspect="1"/>
+          </p:cNvSpPr>
+          <p:nvPr>
+            <p:ph type="sldImg"/>
+          </p:nvPr>
+        </p:nvSpPr>
+        <p:spPr/>
+      </p:sp>
+      <p:sp>
+        <p:nvSpPr>
+          <p:cNvPr id="3" name="Notes Placeholder 2"/>
+          <p:cNvSpPr>
+            <a:spLocks noGrp="1"/>
+          </p:cNvSpPr>
+          <p:nvPr>
+            <p:ph type="body" idx="1"/>
+          </p:nvPr>
+        </p:nvSpPr>
+        <p:spPr/>
+        <p:txBody>
+          <a:bodyPr/>
+          <a:lstStyle/>
+          <a:p>
+            <a:endParaRPr lang="en-US" dirty="0"/>
+          </a:p>
+          <a:p>
+            <a:endParaRPr lang="en-US" dirty="0"/>
+          </a:p>
+        </p:txBody>
+      </p:sp>
+      <p:sp>
+        <p:nvSpPr>
+          <p:cNvPr id="4" name="Slide Number Placeholder 3"/>
+          <p:cNvSpPr>
+            <a:spLocks noGrp="1"/>
+          </p:cNvSpPr>
+          <p:nvPr>
+            <p:ph type="sldNum" sz="quarter" idx="5"/>
+          </p:nvPr>
+        </p:nvSpPr>
+        <p:spPr/>
+        <p:txBody>
+          <a:bodyPr/>
+          <a:lstStyle/>
+          <a:p>
+            <a:fld id="{41EF1AC8-17CF-E441-A1AC-E5F31E914DFE}" type="slidenum">
+              <a:rPr lang="en-US" smtClean="0"/>
+              <a:t>7</a:t>
+            </a:fld>
+            <a:endParaRPr lang="en-US"/>
+          </a:p>
+        </p:txBody>
+      </p:sp>
+    </p:spTree>
+    <p:extLst>
+      <p:ext uri="{BB962C8B-B14F-4D97-AF65-F5344CB8AC3E}">
+        <p14:creationId xmlns:p14="http://schemas.microsoft.com/office/powerpoint/2010/main" val="674428311"/>
+      </p:ext>
+    </p:extLst>
+  </p:cSld>
+  <p:clrMapOvr>
+    <a:masterClrMapping/>
+  </p:clrMapOvr>
+</p:notes>
 </file>
 
 <file path=ppt/slideLayouts/slideLayout1.xml><?xml version="1.0" encoding="utf-8"?>
@@ -7828,6 +7915,36 @@
           </a:p>
         </p:txBody>
       </p:sp>
+      <p:pic>
+        <p:nvPicPr>
+          <p:cNvPr id="3" name="Picture 2" descr="A picture containing calendar&#10;&#10;Description automatically generated">
+            <a:extLst>
+              <a:ext uri="{FF2B5EF4-FFF2-40B4-BE49-F238E27FC236}">
+                <a16:creationId xmlns:a16="http://schemas.microsoft.com/office/drawing/2014/main" id="{2D5818B6-0811-A449-8B6B-A6326D6B63F2}"/>
+              </a:ext>
+            </a:extLst>
+          </p:cNvPr>
+          <p:cNvPicPr>
+            <a:picLocks noChangeAspect="1"/>
+          </p:cNvPicPr>
+          <p:nvPr/>
+        </p:nvPicPr>
+        <p:blipFill>
+          <a:blip r:embed="rId3"/>
+          <a:stretch>
+            <a:fillRect/>
+          </a:stretch>
+        </p:blipFill>
+        <p:spPr>
+          <a:xfrm>
+            <a:off x="3552978" y="635330"/>
+            <a:ext cx="8120268" cy="5587340"/>
+          </a:xfrm>
+          <a:prstGeom prst="rect">
+            <a:avLst/>
+          </a:prstGeom>
+        </p:spPr>
+      </p:pic>
     </p:spTree>
     <p:extLst>
       <p:ext uri="{BB962C8B-B14F-4D97-AF65-F5344CB8AC3E}">

</xml_diff>

<commit_message>
updated ppt with the new dashboard after heatmap ticker adjustment
</commit_message>
<xml_diff>
--- a/Presentation/AFL Dashboard.pptx
+++ b/Presentation/AFL Dashboard.pptx
@@ -4537,10 +4537,10 @@
       </p:grpSpPr>
       <p:pic>
         <p:nvPicPr>
-          <p:cNvPr id="3" name="Picture 2" descr="Graphical user interface, application&#10;&#10;Description automatically generated">
-            <a:extLst>
-              <a:ext uri="{FF2B5EF4-FFF2-40B4-BE49-F238E27FC236}">
-                <a16:creationId xmlns:a16="http://schemas.microsoft.com/office/drawing/2014/main" id="{5F7D5E08-4BCF-6D4D-8984-1261A1BA078D}"/>
+          <p:cNvPr id="4" name="Picture 3" descr="Graphical user interface&#10;&#10;Description automatically generated">
+            <a:extLst>
+              <a:ext uri="{FF2B5EF4-FFF2-40B4-BE49-F238E27FC236}">
+                <a16:creationId xmlns:a16="http://schemas.microsoft.com/office/drawing/2014/main" id="{D579D12A-3459-F74C-A55C-38ECF8031871}"/>
               </a:ext>
             </a:extLst>
           </p:cNvPr>
@@ -4557,8 +4557,8 @@
         </p:blipFill>
         <p:spPr>
           <a:xfrm>
-            <a:off x="3339528" y="77664"/>
-            <a:ext cx="5512944" cy="6702672"/>
+            <a:off x="3994123" y="0"/>
+            <a:ext cx="4203753" cy="6858000"/>
           </a:xfrm>
           <a:prstGeom prst="rect">
             <a:avLst/>

</xml_diff>